<commit_message>
Updated pptx and correlation.m
</commit_message>
<xml_diff>
--- a/Présentation/Présentation_APP4S4.pptx
+++ b/Présentation/Présentation_APP4S4.pptx
@@ -5865,8 +5865,8 @@
         </p:nvSpPr>
         <p:spPr>
           <a:xfrm>
-            <a:off x="1904998" y="2998890"/>
-            <a:ext cx="704039" cy="369332"/>
+            <a:off x="1032456" y="2998890"/>
+            <a:ext cx="1698991" cy="369332"/>
           </a:xfrm>
           <a:prstGeom prst="rect">
             <a:avLst/>
@@ -5881,8 +5881,13 @@
           <a:p>
             <a:r>
               <a:rPr lang="fr-CA" dirty="0"/>
-              <a:t>Son 1</a:t>
-            </a:r>
+              <a:t>Son 1 : 31 </a:t>
+            </a:r>
+            <a:r>
+              <a:rPr lang="fr-CA" dirty="0" err="1"/>
+              <a:t>peaks</a:t>
+            </a:r>
+            <a:endParaRPr lang="fr-CA" dirty="0"/>
           </a:p>
         </p:txBody>
       </p:sp>
@@ -5894,8 +5899,8 @@
         </p:nvSpPr>
         <p:spPr>
           <a:xfrm>
-            <a:off x="1904999" y="4229072"/>
-            <a:ext cx="704039" cy="369332"/>
+            <a:off x="1032455" y="4229072"/>
+            <a:ext cx="1698991" cy="369332"/>
           </a:xfrm>
           <a:prstGeom prst="rect">
             <a:avLst/>
@@ -5910,8 +5915,13 @@
           <a:p>
             <a:r>
               <a:rPr lang="fr-CA" dirty="0"/>
-              <a:t>Son 2</a:t>
-            </a:r>
+              <a:t>Son 2 : 15 </a:t>
+            </a:r>
+            <a:r>
+              <a:rPr lang="fr-CA" dirty="0" err="1"/>
+              <a:t>peaks</a:t>
+            </a:r>
+            <a:endParaRPr lang="fr-CA" dirty="0"/>
           </a:p>
         </p:txBody>
       </p:sp>
@@ -5923,8 +5933,8 @@
         </p:nvSpPr>
         <p:spPr>
           <a:xfrm>
-            <a:off x="1905000" y="5459254"/>
-            <a:ext cx="704039" cy="369332"/>
+            <a:off x="1032455" y="5459254"/>
+            <a:ext cx="1698991" cy="369332"/>
           </a:xfrm>
           <a:prstGeom prst="rect">
             <a:avLst/>
@@ -5939,8 +5949,13 @@
           <a:p>
             <a:r>
               <a:rPr lang="fr-CA" dirty="0"/>
-              <a:t>Son 3</a:t>
-            </a:r>
+              <a:t>Son 3 : 14 </a:t>
+            </a:r>
+            <a:r>
+              <a:rPr lang="fr-CA" dirty="0" err="1"/>
+              <a:t>peaks</a:t>
+            </a:r>
+            <a:endParaRPr lang="fr-CA" dirty="0"/>
           </a:p>
         </p:txBody>
       </p:sp>
@@ -7002,38 +7017,9 @@
           </a:prstGeom>
         </p:spPr>
       </p:pic>
-      <p:sp>
-        <p:nvSpPr>
-          <p:cNvPr id="2" name="Titre 1"/>
-          <p:cNvSpPr>
-            <a:spLocks noGrp="1"/>
-          </p:cNvSpPr>
-          <p:nvPr>
-            <p:ph type="title"/>
-          </p:nvPr>
-        </p:nvSpPr>
-        <p:spPr>
-          <a:xfrm>
-            <a:off x="838200" y="909098"/>
-            <a:ext cx="6696445" cy="1325563"/>
-          </a:xfrm>
-        </p:spPr>
-        <p:txBody>
-          <a:bodyPr>
-            <a:normAutofit/>
-          </a:bodyPr>
-          <a:lstStyle/>
-          <a:p>
-            <a:r>
-              <a:rPr lang="fr-CA" sz="4000" dirty="0"/>
-              <a:t>Présentation des résultats de reconnaissance</a:t>
-            </a:r>
-          </a:p>
-        </p:txBody>
-      </p:sp>
       <p:pic>
         <p:nvPicPr>
-          <p:cNvPr id="5" name="Espace réservé du contenu 4"/>
+          <p:cNvPr id="6" name="Espace réservé du contenu 5"/>
           <p:cNvPicPr>
             <a:picLocks noGrp="1" noChangeAspect="1"/>
           </p:cNvPicPr>
@@ -7055,11 +7041,40 @@
         </p:blipFill>
         <p:spPr>
           <a:xfrm>
-            <a:off x="2232157" y="2220686"/>
-            <a:ext cx="7738320" cy="3999139"/>
+            <a:off x="1886099" y="2005012"/>
+            <a:ext cx="8419822" cy="4351338"/>
           </a:xfrm>
         </p:spPr>
       </p:pic>
+      <p:sp>
+        <p:nvSpPr>
+          <p:cNvPr id="2" name="Titre 1"/>
+          <p:cNvSpPr>
+            <a:spLocks noGrp="1"/>
+          </p:cNvSpPr>
+          <p:nvPr>
+            <p:ph type="title"/>
+          </p:nvPr>
+        </p:nvSpPr>
+        <p:spPr>
+          <a:xfrm>
+            <a:off x="838200" y="909098"/>
+            <a:ext cx="6696445" cy="1325563"/>
+          </a:xfrm>
+        </p:spPr>
+        <p:txBody>
+          <a:bodyPr>
+            <a:normAutofit/>
+          </a:bodyPr>
+          <a:lstStyle/>
+          <a:p>
+            <a:r>
+              <a:rPr lang="fr-CA" sz="4000" dirty="0"/>
+              <a:t>Présentation des résultats de reconnaissance</a:t>
+            </a:r>
+          </a:p>
+        </p:txBody>
+      </p:sp>
       <p:sp>
         <p:nvSpPr>
           <p:cNvPr id="4" name="Espace réservé du numéro de diapositive 3"/>

</xml_diff>

<commit_message>
Updated pptx and added name and cip to all .m files
</commit_message>
<xml_diff>
--- a/Présentation/Présentation_APP4S4.pptx
+++ b/Présentation/Présentation_APP4S4.pptx
@@ -205,7 +205,7 @@
           <a:p>
             <a:fld id="{1C55CD38-CB08-4A24-847C-D091F9CBB18B}" type="datetimeFigureOut">
               <a:rPr lang="fr-CA" smtClean="0"/>
-              <a:t>2017-06-20</a:t>
+              <a:t>2017-06-21</a:t>
             </a:fld>
             <a:endParaRPr lang="fr-CA"/>
           </a:p>
@@ -604,7 +604,7 @@
           <a:p>
             <a:fld id="{52BBA55B-F4C0-4B27-AE96-C8DFD7019907}" type="datetime1">
               <a:rPr lang="fr-CA" smtClean="0"/>
-              <a:t>2017-06-20</a:t>
+              <a:t>2017-06-21</a:t>
             </a:fld>
             <a:endParaRPr lang="fr-CA"/>
           </a:p>
@@ -774,7 +774,7 @@
           <a:p>
             <a:fld id="{57AAE415-9453-43C0-A278-F69B4E4F0C7A}" type="datetime1">
               <a:rPr lang="fr-CA" smtClean="0"/>
-              <a:t>2017-06-20</a:t>
+              <a:t>2017-06-21</a:t>
             </a:fld>
             <a:endParaRPr lang="fr-CA"/>
           </a:p>
@@ -954,7 +954,7 @@
           <a:p>
             <a:fld id="{02180420-BE52-4C86-9C74-8A7572DCF387}" type="datetime1">
               <a:rPr lang="fr-CA" smtClean="0"/>
-              <a:t>2017-06-20</a:t>
+              <a:t>2017-06-21</a:t>
             </a:fld>
             <a:endParaRPr lang="fr-CA"/>
           </a:p>
@@ -1124,7 +1124,7 @@
           <a:p>
             <a:fld id="{90AD1AD8-56F8-494C-B7CA-F39AF89BF9BE}" type="datetime1">
               <a:rPr lang="fr-CA" smtClean="0"/>
-              <a:t>2017-06-20</a:t>
+              <a:t>2017-06-21</a:t>
             </a:fld>
             <a:endParaRPr lang="fr-CA"/>
           </a:p>
@@ -1370,7 +1370,7 @@
           <a:p>
             <a:fld id="{4576A088-4C77-4095-A1B1-1658C294805E}" type="datetime1">
               <a:rPr lang="fr-CA" smtClean="0"/>
-              <a:t>2017-06-20</a:t>
+              <a:t>2017-06-21</a:t>
             </a:fld>
             <a:endParaRPr lang="fr-CA"/>
           </a:p>
@@ -1602,7 +1602,7 @@
           <a:p>
             <a:fld id="{B9058CC0-9B4F-4FB8-9D00-39DE1D9FE638}" type="datetime1">
               <a:rPr lang="fr-CA" smtClean="0"/>
-              <a:t>2017-06-20</a:t>
+              <a:t>2017-06-21</a:t>
             </a:fld>
             <a:endParaRPr lang="fr-CA"/>
           </a:p>
@@ -1969,7 +1969,7 @@
           <a:p>
             <a:fld id="{F4F65949-913B-4934-BD5D-753EBF441788}" type="datetime1">
               <a:rPr lang="fr-CA" smtClean="0"/>
-              <a:t>2017-06-20</a:t>
+              <a:t>2017-06-21</a:t>
             </a:fld>
             <a:endParaRPr lang="fr-CA"/>
           </a:p>
@@ -2087,7 +2087,7 @@
           <a:p>
             <a:fld id="{CE5F6B2A-3AA1-4CE1-8FD7-18AA4E8F8D3C}" type="datetime1">
               <a:rPr lang="fr-CA" smtClean="0"/>
-              <a:t>2017-06-20</a:t>
+              <a:t>2017-06-21</a:t>
             </a:fld>
             <a:endParaRPr lang="fr-CA"/>
           </a:p>
@@ -2182,7 +2182,7 @@
           <a:p>
             <a:fld id="{6EFBFED3-770B-499F-9180-65C1757E9938}" type="datetime1">
               <a:rPr lang="fr-CA" smtClean="0"/>
-              <a:t>2017-06-20</a:t>
+              <a:t>2017-06-21</a:t>
             </a:fld>
             <a:endParaRPr lang="fr-CA"/>
           </a:p>
@@ -2459,7 +2459,7 @@
           <a:p>
             <a:fld id="{7D459A6E-A9EB-4909-A52C-4E8E9F0C1C56}" type="datetime1">
               <a:rPr lang="fr-CA" smtClean="0"/>
-              <a:t>2017-06-20</a:t>
+              <a:t>2017-06-21</a:t>
             </a:fld>
             <a:endParaRPr lang="fr-CA"/>
           </a:p>
@@ -2712,7 +2712,7 @@
           <a:p>
             <a:fld id="{E717396C-4E9A-44C4-B687-E3D0A7E04752}" type="datetime1">
               <a:rPr lang="fr-CA" smtClean="0"/>
-              <a:t>2017-06-20</a:t>
+              <a:t>2017-06-21</a:t>
             </a:fld>
             <a:endParaRPr lang="fr-CA"/>
           </a:p>
@@ -2925,7 +2925,7 @@
           <a:p>
             <a:fld id="{FF907329-49B3-44D4-8960-1DF3ADCEE99C}" type="datetime1">
               <a:rPr lang="fr-CA" smtClean="0"/>
-              <a:t>2017-06-20</a:t>
+              <a:t>2017-06-21</a:t>
             </a:fld>
             <a:endParaRPr lang="fr-CA"/>
           </a:p>
@@ -4973,6 +4973,122 @@
           </a:xfrm>
         </p:spPr>
       </p:pic>
+      <p:sp>
+        <p:nvSpPr>
+          <p:cNvPr id="3" name="ZoneTexte 2"/>
+          <p:cNvSpPr txBox="1"/>
+          <p:nvPr/>
+        </p:nvSpPr>
+        <p:spPr>
+          <a:xfrm>
+            <a:off x="10115961" y="2214973"/>
+            <a:ext cx="1303562" cy="246221"/>
+          </a:xfrm>
+          <a:prstGeom prst="rect">
+            <a:avLst/>
+          </a:prstGeom>
+          <a:noFill/>
+        </p:spPr>
+        <p:txBody>
+          <a:bodyPr wrap="none" rtlCol="0">
+            <a:spAutoFit/>
+          </a:bodyPr>
+          <a:lstStyle/>
+          <a:p>
+            <a:r>
+              <a:rPr lang="fr-CA" sz="1000" dirty="0"/>
+              <a:t>RMS </a:t>
+            </a:r>
+            <a:r>
+              <a:rPr lang="fr-CA" sz="1000" dirty="0" err="1"/>
+              <a:t>spline</a:t>
+            </a:r>
+            <a:r>
+              <a:rPr lang="fr-CA" sz="1000" dirty="0"/>
+              <a:t> 1 </a:t>
+            </a:r>
+            <a:r>
+              <a:rPr lang="fr-CA" sz="1000"/>
+              <a:t>: 0,0020</a:t>
+            </a:r>
+            <a:endParaRPr lang="fr-CA" sz="1000" dirty="0"/>
+          </a:p>
+        </p:txBody>
+      </p:sp>
+      <p:sp>
+        <p:nvSpPr>
+          <p:cNvPr id="8" name="ZoneTexte 7"/>
+          <p:cNvSpPr txBox="1"/>
+          <p:nvPr/>
+        </p:nvSpPr>
+        <p:spPr>
+          <a:xfrm>
+            <a:off x="10140547" y="3848081"/>
+            <a:ext cx="1303562" cy="246221"/>
+          </a:xfrm>
+          <a:prstGeom prst="rect">
+            <a:avLst/>
+          </a:prstGeom>
+          <a:noFill/>
+        </p:spPr>
+        <p:txBody>
+          <a:bodyPr wrap="none" rtlCol="0">
+            <a:spAutoFit/>
+          </a:bodyPr>
+          <a:lstStyle/>
+          <a:p>
+            <a:r>
+              <a:rPr lang="fr-CA" sz="1000" dirty="0"/>
+              <a:t>RMS </a:t>
+            </a:r>
+            <a:r>
+              <a:rPr lang="fr-CA" sz="1000" dirty="0" err="1"/>
+              <a:t>spline</a:t>
+            </a:r>
+            <a:r>
+              <a:rPr lang="fr-CA" sz="1000" dirty="0"/>
+              <a:t> 2 : 0,0025</a:t>
+            </a:r>
+          </a:p>
+        </p:txBody>
+      </p:sp>
+      <p:sp>
+        <p:nvSpPr>
+          <p:cNvPr id="9" name="ZoneTexte 8"/>
+          <p:cNvSpPr txBox="1"/>
+          <p:nvPr/>
+        </p:nvSpPr>
+        <p:spPr>
+          <a:xfrm>
+            <a:off x="10115961" y="5481190"/>
+            <a:ext cx="1303562" cy="246221"/>
+          </a:xfrm>
+          <a:prstGeom prst="rect">
+            <a:avLst/>
+          </a:prstGeom>
+          <a:noFill/>
+        </p:spPr>
+        <p:txBody>
+          <a:bodyPr wrap="none" rtlCol="0">
+            <a:spAutoFit/>
+          </a:bodyPr>
+          <a:lstStyle/>
+          <a:p>
+            <a:r>
+              <a:rPr lang="fr-CA" sz="1000" dirty="0"/>
+              <a:t>RMS </a:t>
+            </a:r>
+            <a:r>
+              <a:rPr lang="fr-CA" sz="1000" dirty="0" err="1"/>
+              <a:t>spline</a:t>
+            </a:r>
+            <a:r>
+              <a:rPr lang="fr-CA" sz="1000" dirty="0"/>
+              <a:t> 3 : 0,0043</a:t>
+            </a:r>
+          </a:p>
+        </p:txBody>
+      </p:sp>
     </p:spTree>
     <p:extLst>
       <p:ext uri="{BB962C8B-B14F-4D97-AF65-F5344CB8AC3E}">

</xml_diff>